<commit_message>
atualização slides de aulas 06Set2023
</commit_message>
<xml_diff>
--- a/01 Classes/Aula 03 Programação Python - input output de Dados Formatação e Estrutura de Sequencial.pptx
+++ b/01 Classes/Aula 03 Programação Python - input output de Dados Formatação e Estrutura de Sequencial.pptx
@@ -5052,7 +5052,7 @@
                 <a:effectLst/>
                 <a:latin typeface="arial" panose="020B0604020202020204" pitchFamily="34" charset="0"/>
               </a:rPr>
-              <a:t>x = 15;</a:t>
+              <a:t>x = 15</a:t>
             </a:r>
           </a:p>
           <a:p>
@@ -5067,7 +5067,7 @@
                 <a:effectLst/>
                 <a:latin typeface="arial" panose="020B0604020202020204" pitchFamily="34" charset="0"/>
               </a:rPr>
-              <a:t>	y = 43;</a:t>
+              <a:t>	y = 43</a:t>
             </a:r>
           </a:p>
           <a:p>
@@ -5102,7 +5102,7 @@
                 <a:effectLst/>
                 <a:latin typeface="arial" panose="020B0604020202020204" pitchFamily="34" charset="0"/>
               </a:rPr>
-              <a:t>(x + y);</a:t>
+              <a:t>(x + y)</a:t>
             </a:r>
             <a:endParaRPr lang="pt-BR" dirty="0">
               <a:solidFill>
@@ -5283,7 +5283,7 @@
                 <a:effectLst/>
                 <a:latin typeface="arial" panose="020B0604020202020204" pitchFamily="34" charset="0"/>
               </a:rPr>
-              <a:t>x = 8;</a:t>
+              <a:t>x = 8</a:t>
             </a:r>
           </a:p>
           <a:p>
@@ -5298,7 +5298,7 @@
                 <a:effectLst/>
                 <a:latin typeface="arial" panose="020B0604020202020204" pitchFamily="34" charset="0"/>
               </a:rPr>
-              <a:t>	y = "Julia“;</a:t>
+              <a:t>	y = "Julia“</a:t>
             </a:r>
           </a:p>
           <a:p>
@@ -5333,7 +5333,7 @@
                 <a:effectLst/>
                 <a:latin typeface="arial" panose="020B0604020202020204" pitchFamily="34" charset="0"/>
               </a:rPr>
-              <a:t>(x + y); # </a:t>
+              <a:t>(x + y) # </a:t>
             </a:r>
             <a:r>
               <a:rPr lang="en-US" b="0" i="0" dirty="0" err="1">
@@ -5573,7 +5573,7 @@
                 <a:effectLst/>
                 <a:latin typeface="arial" panose="020B0604020202020204" pitchFamily="34" charset="0"/>
               </a:rPr>
-              <a:t>x = 8;</a:t>
+              <a:t>x = 8</a:t>
             </a:r>
           </a:p>
           <a:p>
@@ -5588,7 +5588,7 @@
                 <a:effectLst/>
                 <a:latin typeface="arial" panose="020B0604020202020204" pitchFamily="34" charset="0"/>
               </a:rPr>
-              <a:t>	y = "Julia“;</a:t>
+              <a:t>	y = "Julia“</a:t>
             </a:r>
           </a:p>
           <a:p>
@@ -5623,7 +5623,7 @@
                 <a:effectLst/>
                 <a:latin typeface="arial" panose="020B0604020202020204" pitchFamily="34" charset="0"/>
               </a:rPr>
-              <a:t>(x, y); # </a:t>
+              <a:t>(x, y) # </a:t>
             </a:r>
             <a:r>
               <a:rPr lang="es-ES" b="0" i="0" dirty="0" err="1">
@@ -5832,7 +5832,7 @@
                 <a:latin typeface="Times New Roman" panose="02020603050405020304" pitchFamily="18" charset="0"/>
                 <a:cs typeface="Times New Roman" panose="02020603050405020304" pitchFamily="18" charset="0"/>
               </a:rPr>
-              <a:t> é {} reais“;</a:t>
+              <a:t> é {} reais“</a:t>
             </a:r>
           </a:p>
           <a:p>
@@ -5897,7 +5897,7 @@
                 <a:latin typeface="Times New Roman" panose="02020603050405020304" pitchFamily="18" charset="0"/>
                 <a:cs typeface="Times New Roman" panose="02020603050405020304" pitchFamily="18" charset="0"/>
               </a:rPr>
-              <a:t>(valor));</a:t>
+              <a:t>(valor))</a:t>
             </a:r>
           </a:p>
           <a:p>
@@ -5956,7 +5956,7 @@
                 <a:latin typeface="Times New Roman" panose="02020603050405020304" pitchFamily="18" charset="0"/>
                 <a:cs typeface="Times New Roman" panose="02020603050405020304" pitchFamily="18" charset="0"/>
               </a:rPr>
-              <a:t>	valor = 35;</a:t>
+              <a:t>	valor = 35</a:t>
             </a:r>
           </a:p>
           <a:p>
@@ -6031,7 +6031,7 @@
                 <a:latin typeface="Times New Roman" panose="02020603050405020304" pitchFamily="18" charset="0"/>
                 <a:cs typeface="Times New Roman" panose="02020603050405020304" pitchFamily="18" charset="0"/>
               </a:rPr>
-              <a:t>(valor));</a:t>
+              <a:t>(valor))</a:t>
             </a:r>
             <a:endParaRPr lang="pt-BR" dirty="0">
               <a:solidFill>
@@ -6185,7 +6185,7 @@
                 <a:latin typeface="Times New Roman" panose="02020603050405020304" pitchFamily="18" charset="0"/>
                 <a:cs typeface="Times New Roman" panose="02020603050405020304" pitchFamily="18" charset="0"/>
               </a:rPr>
-              <a:t>	valor = 35.6;</a:t>
+              <a:t>	valor = 35.6</a:t>
             </a:r>
           </a:p>
           <a:p>
@@ -6270,7 +6270,7 @@
                 <a:latin typeface="Times New Roman" panose="02020603050405020304" pitchFamily="18" charset="0"/>
                 <a:cs typeface="Times New Roman" panose="02020603050405020304" pitchFamily="18" charset="0"/>
               </a:rPr>
-              <a:t>(valor));</a:t>
+              <a:t>(valor))</a:t>
             </a:r>
             <a:endParaRPr lang="pt-BR" dirty="0">
               <a:solidFill>
@@ -6436,7 +6436,7 @@
                 <a:latin typeface="Times New Roman" panose="02020603050405020304" pitchFamily="18" charset="0"/>
                 <a:cs typeface="Times New Roman" panose="02020603050405020304" pitchFamily="18" charset="0"/>
               </a:rPr>
-              <a:t>	qtd = 12;</a:t>
+              <a:t>	qtd = 12</a:t>
             </a:r>
           </a:p>
           <a:p>
@@ -6471,7 +6471,7 @@
                 <a:latin typeface="Times New Roman" panose="02020603050405020304" pitchFamily="18" charset="0"/>
                 <a:cs typeface="Times New Roman" panose="02020603050405020304" pitchFamily="18" charset="0"/>
               </a:rPr>
-              <a:t> = 135;</a:t>
+              <a:t> = 135</a:t>
             </a:r>
           </a:p>
           <a:p>
@@ -6506,7 +6506,7 @@
                 <a:latin typeface="Times New Roman" panose="02020603050405020304" pitchFamily="18" charset="0"/>
                 <a:cs typeface="Times New Roman" panose="02020603050405020304" pitchFamily="18" charset="0"/>
               </a:rPr>
-              <a:t> = 34;</a:t>
+              <a:t> = 34</a:t>
             </a:r>
           </a:p>
           <a:p>
@@ -6621,7 +6621,7 @@
                 <a:latin typeface="Times New Roman" panose="02020603050405020304" pitchFamily="18" charset="0"/>
                 <a:cs typeface="Times New Roman" panose="02020603050405020304" pitchFamily="18" charset="0"/>
               </a:rPr>
-              <a:t> {:.2f} reais.“;</a:t>
+              <a:t> {:.2f} reais.“</a:t>
             </a:r>
           </a:p>
           <a:p>
@@ -6726,7 +6726,7 @@
                 <a:latin typeface="Times New Roman" panose="02020603050405020304" pitchFamily="18" charset="0"/>
                 <a:cs typeface="Times New Roman" panose="02020603050405020304" pitchFamily="18" charset="0"/>
               </a:rPr>
-              <a:t>));</a:t>
+              <a:t>))</a:t>
             </a:r>
             <a:endParaRPr lang="pt-BR" dirty="0">
               <a:solidFill>
@@ -6880,7 +6880,7 @@
                 <a:latin typeface="Times New Roman" panose="02020603050405020304" pitchFamily="18" charset="0"/>
                 <a:cs typeface="Times New Roman" panose="02020603050405020304" pitchFamily="18" charset="0"/>
               </a:rPr>
-              <a:t>	qtd = 12;</a:t>
+              <a:t>	qtd = 12</a:t>
             </a:r>
           </a:p>
           <a:p>
@@ -6915,7 +6915,7 @@
                 <a:latin typeface="Times New Roman" panose="02020603050405020304" pitchFamily="18" charset="0"/>
                 <a:cs typeface="Times New Roman" panose="02020603050405020304" pitchFamily="18" charset="0"/>
               </a:rPr>
-              <a:t> = 135;</a:t>
+              <a:t> = 135</a:t>
             </a:r>
           </a:p>
           <a:p>
@@ -6950,7 +6950,7 @@
                 <a:latin typeface="Times New Roman" panose="02020603050405020304" pitchFamily="18" charset="0"/>
                 <a:cs typeface="Times New Roman" panose="02020603050405020304" pitchFamily="18" charset="0"/>
               </a:rPr>
-              <a:t> = 34;</a:t>
+              <a:t> = 34</a:t>
             </a:r>
           </a:p>
           <a:p>
@@ -7065,7 +7065,7 @@
                 <a:latin typeface="Times New Roman" panose="02020603050405020304" pitchFamily="18" charset="0"/>
                 <a:cs typeface="Times New Roman" panose="02020603050405020304" pitchFamily="18" charset="0"/>
               </a:rPr>
-              <a:t> {2:.2f} reais.’; # </a:t>
+              <a:t> {2:.2f} reais.’ # </a:t>
             </a:r>
             <a:r>
               <a:rPr lang="en-US" b="1" dirty="0">
@@ -7260,7 +7260,7 @@
                 <a:latin typeface="Times New Roman" panose="02020603050405020304" pitchFamily="18" charset="0"/>
                 <a:cs typeface="Times New Roman" panose="02020603050405020304" pitchFamily="18" charset="0"/>
               </a:rPr>
-              <a:t>));</a:t>
+              <a:t>))</a:t>
             </a:r>
             <a:endParaRPr lang="pt-BR" dirty="0">
               <a:solidFill>
@@ -7434,7 +7434,7 @@
                 <a:latin typeface="Times New Roman" panose="02020603050405020304" pitchFamily="18" charset="0"/>
                 <a:cs typeface="Times New Roman" panose="02020603050405020304" pitchFamily="18" charset="0"/>
               </a:rPr>
-              <a:t> = 25;</a:t>
+              <a:t> = 25</a:t>
             </a:r>
           </a:p>
           <a:p>
@@ -7469,7 +7469,7 @@
                 <a:latin typeface="Times New Roman" panose="02020603050405020304" pitchFamily="18" charset="0"/>
                 <a:cs typeface="Times New Roman" panose="02020603050405020304" pitchFamily="18" charset="0"/>
               </a:rPr>
-              <a:t> = "Julia“;</a:t>
+              <a:t> = "Julia“</a:t>
             </a:r>
           </a:p>
           <a:p>
@@ -7544,7 +7544,7 @@
                 <a:latin typeface="Times New Roman" panose="02020603050405020304" pitchFamily="18" charset="0"/>
                 <a:cs typeface="Times New Roman" panose="02020603050405020304" pitchFamily="18" charset="0"/>
               </a:rPr>
-              <a:t>.“;</a:t>
+              <a:t>.“</a:t>
             </a:r>
           </a:p>
           <a:p>
@@ -7639,7 +7639,7 @@
                 <a:latin typeface="Times New Roman" panose="02020603050405020304" pitchFamily="18" charset="0"/>
                 <a:cs typeface="Times New Roman" panose="02020603050405020304" pitchFamily="18" charset="0"/>
               </a:rPr>
-              <a:t>));</a:t>
+              <a:t>))</a:t>
             </a:r>
             <a:endParaRPr lang="pt-BR" dirty="0">
               <a:solidFill>
@@ -7888,7 +7888,7 @@
                 <a:latin typeface="Times New Roman" panose="02020603050405020304" pitchFamily="18" charset="0"/>
                 <a:cs typeface="Times New Roman" panose="02020603050405020304" pitchFamily="18" charset="0"/>
               </a:rPr>
-              <a:t>}.’;</a:t>
+              <a:t>}.’</a:t>
             </a:r>
           </a:p>
           <a:p>
@@ -7983,7 +7983,7 @@
                 <a:latin typeface="Times New Roman" panose="02020603050405020304" pitchFamily="18" charset="0"/>
                 <a:cs typeface="Times New Roman" panose="02020603050405020304" pitchFamily="18" charset="0"/>
               </a:rPr>
-              <a:t> = ‘Gol’));</a:t>
+              <a:t> = ‘Gol’))</a:t>
             </a:r>
             <a:endParaRPr lang="pt-BR" dirty="0">
               <a:solidFill>
@@ -8162,7 +8162,7 @@
                 <a:latin typeface="Times New Roman" panose="02020603050405020304" pitchFamily="18" charset="0"/>
                 <a:cs typeface="Times New Roman" panose="02020603050405020304" pitchFamily="18" charset="0"/>
               </a:rPr>
-              <a:t> = 17;</a:t>
+              <a:t> = 17</a:t>
             </a:r>
           </a:p>
           <a:p>
@@ -8190,6 +8190,68 @@
               <a:t> = "</a:t>
             </a:r>
             <a:r>
+              <a:rPr lang="en-US">
+                <a:solidFill>
+                  <a:schemeClr val="tx1"/>
+                </a:solidFill>
+                <a:latin typeface="Times New Roman" panose="02020603050405020304" pitchFamily="18" charset="0"/>
+                <a:cs typeface="Times New Roman" panose="02020603050405020304" pitchFamily="18" charset="0"/>
+              </a:rPr>
+              <a:t>Júlia"</a:t>
+            </a:r>
+            <a:endParaRPr lang="en-US" dirty="0">
+              <a:solidFill>
+                <a:schemeClr val="tx1"/>
+              </a:solidFill>
+              <a:latin typeface="Times New Roman" panose="02020603050405020304" pitchFamily="18" charset="0"/>
+              <a:cs typeface="Times New Roman" panose="02020603050405020304" pitchFamily="18" charset="0"/>
+            </a:endParaRPr>
+          </a:p>
+          <a:p>
+            <a:pPr marL="447675" lvl="1" indent="0" algn="just">
+              <a:buNone/>
+            </a:pPr>
+            <a:r>
+              <a:rPr lang="en-US" b="1" dirty="0">
+                <a:solidFill>
+                  <a:schemeClr val="tx1"/>
+                </a:solidFill>
+                <a:latin typeface="Times New Roman" panose="02020603050405020304" pitchFamily="18" charset="0"/>
+                <a:cs typeface="Times New Roman" panose="02020603050405020304" pitchFamily="18" charset="0"/>
+              </a:rPr>
+              <a:t>print</a:t>
+            </a:r>
+            <a:r>
+              <a:rPr lang="en-US" dirty="0">
+                <a:solidFill>
+                  <a:schemeClr val="tx1"/>
+                </a:solidFill>
+                <a:latin typeface="Times New Roman" panose="02020603050405020304" pitchFamily="18" charset="0"/>
+                <a:cs typeface="Times New Roman" panose="02020603050405020304" pitchFamily="18" charset="0"/>
+              </a:rPr>
+              <a:t>(</a:t>
+            </a:r>
+            <a:r>
+              <a:rPr lang="en-US" b="1" dirty="0">
+                <a:solidFill>
+                  <a:srgbClr val="FF0000"/>
+                </a:solidFill>
+                <a:latin typeface="Times New Roman" panose="02020603050405020304" pitchFamily="18" charset="0"/>
+                <a:cs typeface="Times New Roman" panose="02020603050405020304" pitchFamily="18" charset="0"/>
+              </a:rPr>
+              <a:t>f</a:t>
+            </a:r>
+            <a:r>
+              <a:rPr lang="en-US" dirty="0">
+                <a:solidFill>
+                  <a:schemeClr val="tx1"/>
+                </a:solidFill>
+                <a:latin typeface="Times New Roman" panose="02020603050405020304" pitchFamily="18" charset="0"/>
+                <a:cs typeface="Times New Roman" panose="02020603050405020304" pitchFamily="18" charset="0"/>
+              </a:rPr>
+              <a:t>"{</a:t>
+            </a:r>
+            <a:r>
               <a:rPr lang="en-US" dirty="0" err="1">
                 <a:solidFill>
                   <a:schemeClr val="tx1"/>
@@ -8197,7 +8259,7 @@
                 <a:latin typeface="Times New Roman" panose="02020603050405020304" pitchFamily="18" charset="0"/>
                 <a:cs typeface="Times New Roman" panose="02020603050405020304" pitchFamily="18" charset="0"/>
               </a:rPr>
-              <a:t>Júlia</a:t>
+              <a:t>idade</a:t>
             </a:r>
             <a:r>
               <a:rPr lang="en-US" dirty="0">
@@ -8207,22 +8269,17 @@
                 <a:latin typeface="Times New Roman" panose="02020603050405020304" pitchFamily="18" charset="0"/>
                 <a:cs typeface="Times New Roman" panose="02020603050405020304" pitchFamily="18" charset="0"/>
               </a:rPr>
-              <a:t>“;</a:t>
-            </a:r>
-          </a:p>
-          <a:p>
-            <a:pPr marL="447675" lvl="1" indent="0" algn="just">
-              <a:buNone/>
-            </a:pPr>
-            <a:r>
-              <a:rPr lang="en-US" b="1" dirty="0">
-                <a:solidFill>
-                  <a:schemeClr val="tx1"/>
-                </a:solidFill>
-                <a:latin typeface="Times New Roman" panose="02020603050405020304" pitchFamily="18" charset="0"/>
-                <a:cs typeface="Times New Roman" panose="02020603050405020304" pitchFamily="18" charset="0"/>
-              </a:rPr>
-              <a:t>print</a:t>
+              <a:t>} {</a:t>
+            </a:r>
+            <a:r>
+              <a:rPr lang="en-US" dirty="0" err="1">
+                <a:solidFill>
+                  <a:schemeClr val="tx1"/>
+                </a:solidFill>
+                <a:latin typeface="Times New Roman" panose="02020603050405020304" pitchFamily="18" charset="0"/>
+                <a:cs typeface="Times New Roman" panose="02020603050405020304" pitchFamily="18" charset="0"/>
+              </a:rPr>
+              <a:t>nome</a:t>
             </a:r>
             <a:r>
               <a:rPr lang="en-US" dirty="0">
@@ -8232,67 +8289,7 @@
                 <a:latin typeface="Times New Roman" panose="02020603050405020304" pitchFamily="18" charset="0"/>
                 <a:cs typeface="Times New Roman" panose="02020603050405020304" pitchFamily="18" charset="0"/>
               </a:rPr>
-              <a:t>(</a:t>
-            </a:r>
-            <a:r>
-              <a:rPr lang="en-US" b="1" dirty="0">
-                <a:solidFill>
-                  <a:srgbClr val="FF0000"/>
-                </a:solidFill>
-                <a:latin typeface="Times New Roman" panose="02020603050405020304" pitchFamily="18" charset="0"/>
-                <a:cs typeface="Times New Roman" panose="02020603050405020304" pitchFamily="18" charset="0"/>
-              </a:rPr>
-              <a:t>f</a:t>
-            </a:r>
-            <a:r>
-              <a:rPr lang="en-US" dirty="0">
-                <a:solidFill>
-                  <a:schemeClr val="tx1"/>
-                </a:solidFill>
-                <a:latin typeface="Times New Roman" panose="02020603050405020304" pitchFamily="18" charset="0"/>
-                <a:cs typeface="Times New Roman" panose="02020603050405020304" pitchFamily="18" charset="0"/>
-              </a:rPr>
-              <a:t>"{</a:t>
-            </a:r>
-            <a:r>
-              <a:rPr lang="en-US" dirty="0" err="1">
-                <a:solidFill>
-                  <a:schemeClr val="tx1"/>
-                </a:solidFill>
-                <a:latin typeface="Times New Roman" panose="02020603050405020304" pitchFamily="18" charset="0"/>
-                <a:cs typeface="Times New Roman" panose="02020603050405020304" pitchFamily="18" charset="0"/>
-              </a:rPr>
-              <a:t>idade</a:t>
-            </a:r>
-            <a:r>
-              <a:rPr lang="en-US" dirty="0">
-                <a:solidFill>
-                  <a:schemeClr val="tx1"/>
-                </a:solidFill>
-                <a:latin typeface="Times New Roman" panose="02020603050405020304" pitchFamily="18" charset="0"/>
-                <a:cs typeface="Times New Roman" panose="02020603050405020304" pitchFamily="18" charset="0"/>
-              </a:rPr>
-              <a:t>} {</a:t>
-            </a:r>
-            <a:r>
-              <a:rPr lang="en-US" dirty="0" err="1">
-                <a:solidFill>
-                  <a:schemeClr val="tx1"/>
-                </a:solidFill>
-                <a:latin typeface="Times New Roman" panose="02020603050405020304" pitchFamily="18" charset="0"/>
-                <a:cs typeface="Times New Roman" panose="02020603050405020304" pitchFamily="18" charset="0"/>
-              </a:rPr>
-              <a:t>nome</a:t>
-            </a:r>
-            <a:r>
-              <a:rPr lang="en-US" dirty="0">
-                <a:solidFill>
-                  <a:schemeClr val="tx1"/>
-                </a:solidFill>
-                <a:latin typeface="Times New Roman" panose="02020603050405020304" pitchFamily="18" charset="0"/>
-                <a:cs typeface="Times New Roman" panose="02020603050405020304" pitchFamily="18" charset="0"/>
-              </a:rPr>
-              <a:t>}");</a:t>
+              <a:t>}")</a:t>
             </a:r>
           </a:p>
         </p:txBody>
@@ -10155,7 +10152,7 @@
                 <a:latin typeface="Times New Roman" panose="02020603050405020304" pitchFamily="18" charset="0"/>
                 <a:cs typeface="Times New Roman" panose="02020603050405020304" pitchFamily="18" charset="0"/>
               </a:rPr>
-              <a:t>("Hello, World!");</a:t>
+              <a:t>("Hello, World!")</a:t>
             </a:r>
           </a:p>
           <a:p>
@@ -10192,7 +10189,7 @@
                 <a:latin typeface="Times New Roman" panose="02020603050405020304" pitchFamily="18" charset="0"/>
                 <a:cs typeface="Times New Roman" panose="02020603050405020304" pitchFamily="18" charset="0"/>
               </a:rPr>
-              <a:t>("Hello, World!"); # </a:t>
+              <a:t>("Hello, World!") # </a:t>
             </a:r>
             <a:r>
               <a:rPr lang="en-US" b="1" dirty="0" err="1">
@@ -10225,7 +10222,7 @@
               <a:t>comentário</a:t>
             </a:r>
             <a:r>
-              <a:rPr lang="en-US" b="1">
+              <a:rPr lang="en-US" b="1" dirty="0">
                 <a:solidFill>
                   <a:srgbClr val="FF0000"/>
                 </a:solidFill>
@@ -10420,7 +10417,7 @@
                 <a:latin typeface="Times New Roman" panose="02020603050405020304" pitchFamily="18" charset="0"/>
                 <a:cs typeface="Times New Roman" panose="02020603050405020304" pitchFamily="18" charset="0"/>
               </a:rPr>
-              <a:t>("Informe o nome:");</a:t>
+              <a:t>("Informe o nome:")</a:t>
             </a:r>
           </a:p>
           <a:p>
@@ -10445,7 +10442,7 @@
                 <a:latin typeface="Times New Roman" panose="02020603050405020304" pitchFamily="18" charset="0"/>
                 <a:cs typeface="Times New Roman" panose="02020603050405020304" pitchFamily="18" charset="0"/>
               </a:rPr>
-              <a:t>("Meu nome é: " + nome);</a:t>
+              <a:t>("Meu nome é: " + nome)</a:t>
             </a:r>
           </a:p>
         </p:txBody>
@@ -10577,7 +10574,7 @@
                 <a:latin typeface="Times New Roman" panose="02020603050405020304" pitchFamily="18" charset="0"/>
                 <a:cs typeface="Times New Roman" panose="02020603050405020304" pitchFamily="18" charset="0"/>
               </a:rPr>
-              <a:t>("Informe sua idade:"));</a:t>
+              <a:t>("Informe sua idade:"))</a:t>
             </a:r>
           </a:p>
           <a:p>
@@ -10602,7 +10599,7 @@
                 <a:latin typeface="Times New Roman" panose="02020603050405020304" pitchFamily="18" charset="0"/>
                 <a:cs typeface="Times New Roman" panose="02020603050405020304" pitchFamily="18" charset="0"/>
               </a:rPr>
-              <a:t>("Meu nome é: ", idade);</a:t>
+              <a:t>("Meu nome é: ", idade)</a:t>
             </a:r>
           </a:p>
           <a:p>
@@ -10659,25 +10656,8 @@
                 <a:latin typeface="Times New Roman" panose="02020603050405020304" pitchFamily="18" charset="0"/>
                 <a:cs typeface="Times New Roman" panose="02020603050405020304" pitchFamily="18" charset="0"/>
               </a:rPr>
-              <a:t>("Informe o </a:t>
-            </a:r>
-            <a:r>
-              <a:rPr lang="pt-BR">
-                <a:solidFill>
-                  <a:schemeClr val="tx1"/>
-                </a:solidFill>
-                <a:latin typeface="Times New Roman" panose="02020603050405020304" pitchFamily="18" charset="0"/>
-                <a:cs typeface="Times New Roman" panose="02020603050405020304" pitchFamily="18" charset="0"/>
-              </a:rPr>
-              <a:t>salário:"));</a:t>
-            </a:r>
-            <a:endParaRPr lang="pt-BR" dirty="0">
-              <a:solidFill>
-                <a:schemeClr val="tx1"/>
-              </a:solidFill>
-              <a:latin typeface="Times New Roman" panose="02020603050405020304" pitchFamily="18" charset="0"/>
-              <a:cs typeface="Times New Roman" panose="02020603050405020304" pitchFamily="18" charset="0"/>
-            </a:endParaRPr>
+              <a:t>("Informe o salário:"))</a:t>
+            </a:r>
           </a:p>
           <a:p>
             <a:pPr marL="0" indent="0" algn="just">
@@ -10701,7 +10681,7 @@
                 <a:latin typeface="Times New Roman" panose="02020603050405020304" pitchFamily="18" charset="0"/>
                 <a:cs typeface="Times New Roman" panose="02020603050405020304" pitchFamily="18" charset="0"/>
               </a:rPr>
-              <a:t>("Meu nome é: ", salario);</a:t>
+              <a:t>("Meu nome é: ", salario)</a:t>
             </a:r>
           </a:p>
           <a:p>
@@ -11061,7 +11041,7 @@
                 <a:effectLst/>
                 <a:latin typeface="arial" panose="020B0604020202020204" pitchFamily="34" charset="0"/>
               </a:rPr>
-              <a:t>x = "Python é incrível“;</a:t>
+              <a:t>x = "Python é incrível“</a:t>
             </a:r>
           </a:p>
           <a:p>
@@ -11095,7 +11075,7 @@
                 <a:effectLst/>
                 <a:latin typeface="arial" panose="020B0604020202020204" pitchFamily="34" charset="0"/>
               </a:rPr>
-              <a:t>(x);</a:t>
+              <a:t>(x)</a:t>
             </a:r>
             <a:endParaRPr lang="it-IT" dirty="0">
               <a:solidFill>
@@ -11288,7 +11268,7 @@
                 <a:effectLst/>
                 <a:latin typeface="arial" panose="020B0604020202020204" pitchFamily="34" charset="0"/>
               </a:rPr>
-              <a:t>x = "Python“;</a:t>
+              <a:t>x = "Python“</a:t>
             </a:r>
           </a:p>
           <a:p>
@@ -11303,7 +11283,7 @@
                 <a:effectLst/>
                 <a:latin typeface="arial" panose="020B0604020202020204" pitchFamily="34" charset="0"/>
               </a:rPr>
-              <a:t>	y = “é“;</a:t>
+              <a:t>	y = “é“</a:t>
             </a:r>
           </a:p>
           <a:p>
@@ -11318,7 +11298,7 @@
                 <a:effectLst/>
                 <a:latin typeface="arial" panose="020B0604020202020204" pitchFamily="34" charset="0"/>
               </a:rPr>
-              <a:t>	z = “incrível“;</a:t>
+              <a:t>	z = “incrível“</a:t>
             </a:r>
           </a:p>
           <a:p>
@@ -11353,7 +11333,7 @@
                 <a:effectLst/>
                 <a:latin typeface="arial" panose="020B0604020202020204" pitchFamily="34" charset="0"/>
               </a:rPr>
-              <a:t>(x, y, z);</a:t>
+              <a:t>(x, y, z)</a:t>
             </a:r>
             <a:endParaRPr lang="pt-BR" dirty="0">
               <a:solidFill>
@@ -11534,7 +11514,7 @@
                 <a:effectLst/>
                 <a:latin typeface="arial" panose="020B0604020202020204" pitchFamily="34" charset="0"/>
               </a:rPr>
-              <a:t>x = "Python“;</a:t>
+              <a:t>x = "Python“</a:t>
             </a:r>
           </a:p>
           <a:p>
@@ -11549,7 +11529,7 @@
                 <a:effectLst/>
                 <a:latin typeface="arial" panose="020B0604020202020204" pitchFamily="34" charset="0"/>
               </a:rPr>
-              <a:t>	y = “é“;</a:t>
+              <a:t>	y = “é“</a:t>
             </a:r>
           </a:p>
           <a:p>
@@ -11564,7 +11544,7 @@
                 <a:effectLst/>
                 <a:latin typeface="arial" panose="020B0604020202020204" pitchFamily="34" charset="0"/>
               </a:rPr>
-              <a:t>	z = “incrível“;</a:t>
+              <a:t>	z = “incrível“</a:t>
             </a:r>
           </a:p>
           <a:p>
@@ -11599,7 +11579,7 @@
                 <a:effectLst/>
                 <a:latin typeface="arial" panose="020B0604020202020204" pitchFamily="34" charset="0"/>
               </a:rPr>
-              <a:t>(x + y + z);</a:t>
+              <a:t>(x + y + z)</a:t>
             </a:r>
             <a:endParaRPr lang="pt-BR" dirty="0">
               <a:solidFill>

</xml_diff>